<commit_message>
Added a lot of stuff. I should really clean this up...
</commit_message>
<xml_diff>
--- a/EmpathicRefactoring.pptx
+++ b/EmpathicRefactoring.pptx
@@ -11209,9 +11209,9 @@
                 <a:ea typeface="Roboto" pitchFamily="2" charset="0"/>
                 <a:cs typeface="Consolas" pitchFamily="49" charset="0"/>
               </a:rPr>
-              <a:t>(double </a:t>
-            </a:r>
-            <a:r>
+              <a:t>(double amount)</a:t>
+            </a:r>
+            <a:br>
               <a:rPr lang="en-US" sz="2000" b="1" dirty="0" smtClean="0">
                 <a:solidFill>
                   <a:schemeClr val="bg1">
@@ -11222,9 +11222,8 @@
                 <a:ea typeface="Roboto" pitchFamily="2" charset="0"/>
                 <a:cs typeface="Consolas" pitchFamily="49" charset="0"/>
               </a:rPr>
-              <a:t>amount)</a:t>
-            </a:r>
-            <a:br>
+            </a:br>
+            <a:r>
               <a:rPr lang="en-US" sz="2000" b="1" dirty="0" smtClean="0">
                 <a:solidFill>
                   <a:schemeClr val="bg1">
@@ -11235,8 +11234,9 @@
                 <a:ea typeface="Roboto" pitchFamily="2" charset="0"/>
                 <a:cs typeface="Consolas" pitchFamily="49" charset="0"/>
               </a:rPr>
-            </a:br>
-            <a:r>
+              <a:t>{</a:t>
+            </a:r>
+            <a:br>
               <a:rPr lang="en-US" sz="2000" b="1" dirty="0" smtClean="0">
                 <a:solidFill>
                   <a:schemeClr val="bg1">
@@ -11247,9 +11247,41 @@
                 <a:ea typeface="Roboto" pitchFamily="2" charset="0"/>
                 <a:cs typeface="Consolas" pitchFamily="49" charset="0"/>
               </a:rPr>
-              <a:t>{</a:t>
-            </a:r>
-            <a:br>
+            </a:br>
+            <a:r>
+              <a:rPr lang="en-US" sz="2000" b="1" dirty="0" smtClean="0">
+                <a:solidFill>
+                  <a:schemeClr val="bg1"/>
+                </a:solidFill>
+                <a:latin typeface="Consolas" pitchFamily="49" charset="0"/>
+                <a:ea typeface="Roboto" pitchFamily="2" charset="0"/>
+                <a:cs typeface="Consolas" pitchFamily="49" charset="0"/>
+              </a:rPr>
+              <a:t>	</a:t>
+            </a:r>
+            <a:r>
+              <a:rPr lang="en-US" sz="2000" b="1" dirty="0" err="1" smtClean="0">
+                <a:solidFill>
+                  <a:schemeClr val="bg1"/>
+                </a:solidFill>
+                <a:latin typeface="Consolas" pitchFamily="49" charset="0"/>
+                <a:ea typeface="Roboto" pitchFamily="2" charset="0"/>
+                <a:cs typeface="Consolas" pitchFamily="49" charset="0"/>
+              </a:rPr>
+              <a:t>printBanner</a:t>
+            </a:r>
+            <a:r>
+              <a:rPr lang="en-US" sz="2000" b="1" dirty="0" smtClean="0">
+                <a:solidFill>
+                  <a:schemeClr val="bg1"/>
+                </a:solidFill>
+                <a:latin typeface="Consolas" pitchFamily="49" charset="0"/>
+                <a:ea typeface="Roboto" pitchFamily="2" charset="0"/>
+                <a:cs typeface="Consolas" pitchFamily="49" charset="0"/>
+              </a:rPr>
+              <a:t>();</a:t>
+            </a:r>
+            <a:r>
               <a:rPr lang="en-US" sz="2000" b="1" dirty="0" smtClean="0">
                 <a:solidFill>
                   <a:schemeClr val="bg1">
@@ -11260,41 +11292,9 @@
                 <a:ea typeface="Roboto" pitchFamily="2" charset="0"/>
                 <a:cs typeface="Consolas" pitchFamily="49" charset="0"/>
               </a:rPr>
-            </a:br>
-            <a:r>
-              <a:rPr lang="en-US" sz="2000" b="1" dirty="0" smtClean="0">
-                <a:solidFill>
-                  <a:schemeClr val="bg1"/>
-                </a:solidFill>
-                <a:latin typeface="Consolas" pitchFamily="49" charset="0"/>
-                <a:ea typeface="Roboto" pitchFamily="2" charset="0"/>
-                <a:cs typeface="Consolas" pitchFamily="49" charset="0"/>
-              </a:rPr>
-              <a:t>	</a:t>
-            </a:r>
-            <a:r>
-              <a:rPr lang="en-US" sz="2000" b="1" dirty="0" err="1" smtClean="0">
-                <a:solidFill>
-                  <a:schemeClr val="bg1"/>
-                </a:solidFill>
-                <a:latin typeface="Consolas" pitchFamily="49" charset="0"/>
-                <a:ea typeface="Roboto" pitchFamily="2" charset="0"/>
-                <a:cs typeface="Consolas" pitchFamily="49" charset="0"/>
-              </a:rPr>
-              <a:t>printBanner</a:t>
-            </a:r>
-            <a:r>
-              <a:rPr lang="en-US" sz="2000" b="1" dirty="0" smtClean="0">
-                <a:solidFill>
-                  <a:schemeClr val="bg1"/>
-                </a:solidFill>
-                <a:latin typeface="Consolas" pitchFamily="49" charset="0"/>
-                <a:ea typeface="Roboto" pitchFamily="2" charset="0"/>
-                <a:cs typeface="Consolas" pitchFamily="49" charset="0"/>
-              </a:rPr>
-              <a:t>();</a:t>
-            </a:r>
-            <a:r>
+              <a:t/>
+            </a:r>
+            <a:br>
               <a:rPr lang="en-US" sz="2000" b="1" dirty="0" smtClean="0">
                 <a:solidFill>
                   <a:schemeClr val="bg1">
@@ -11305,20 +11305,29 @@
                 <a:ea typeface="Roboto" pitchFamily="2" charset="0"/>
                 <a:cs typeface="Consolas" pitchFamily="49" charset="0"/>
               </a:rPr>
-              <a:t/>
-            </a:r>
-            <a:br>
+            </a:br>
+            <a:r>
               <a:rPr lang="en-US" sz="2000" b="1" dirty="0" smtClean="0">
                 <a:solidFill>
-                  <a:schemeClr val="bg1">
-                    <a:lumMod val="65000"/>
-                  </a:schemeClr>
-                </a:solidFill>
-                <a:latin typeface="Consolas" pitchFamily="49" charset="0"/>
-                <a:ea typeface="Roboto" pitchFamily="2" charset="0"/>
-                <a:cs typeface="Consolas" pitchFamily="49" charset="0"/>
-              </a:rPr>
-            </a:br>
+                  <a:schemeClr val="bg1"/>
+                </a:solidFill>
+                <a:latin typeface="Consolas" pitchFamily="49" charset="0"/>
+                <a:ea typeface="Roboto" pitchFamily="2" charset="0"/>
+                <a:cs typeface="Consolas" pitchFamily="49" charset="0"/>
+              </a:rPr>
+              <a:t>	</a:t>
+            </a:r>
+            <a:r>
+              <a:rPr lang="en-US" sz="2000" b="1" dirty="0" err="1" smtClean="0">
+                <a:solidFill>
+                  <a:schemeClr val="bg1"/>
+                </a:solidFill>
+                <a:latin typeface="Consolas" pitchFamily="49" charset="0"/>
+                <a:ea typeface="Roboto" pitchFamily="2" charset="0"/>
+                <a:cs typeface="Consolas" pitchFamily="49" charset="0"/>
+              </a:rPr>
+              <a:t>printDetails</a:t>
+            </a:r>
             <a:r>
               <a:rPr lang="en-US" sz="2000" b="1" dirty="0" smtClean="0">
                 <a:solidFill>
@@ -11328,40 +11337,7 @@
                 <a:ea typeface="Roboto" pitchFamily="2" charset="0"/>
                 <a:cs typeface="Consolas" pitchFamily="49" charset="0"/>
               </a:rPr>
-              <a:t>	</a:t>
-            </a:r>
-            <a:r>
-              <a:rPr lang="en-US" sz="2000" b="1" dirty="0" err="1" smtClean="0">
-                <a:solidFill>
-                  <a:schemeClr val="bg1"/>
-                </a:solidFill>
-                <a:latin typeface="Consolas" pitchFamily="49" charset="0"/>
-                <a:ea typeface="Roboto" pitchFamily="2" charset="0"/>
-                <a:cs typeface="Consolas" pitchFamily="49" charset="0"/>
-              </a:rPr>
-              <a:t>printDetails</a:t>
-            </a:r>
-            <a:r>
-              <a:rPr lang="en-US" sz="2000" b="1" dirty="0" smtClean="0">
-                <a:solidFill>
-                  <a:schemeClr val="bg1"/>
-                </a:solidFill>
-                <a:latin typeface="Consolas" pitchFamily="49" charset="0"/>
-                <a:ea typeface="Roboto" pitchFamily="2" charset="0"/>
-                <a:cs typeface="Consolas" pitchFamily="49" charset="0"/>
-              </a:rPr>
-              <a:t>(amount</a:t>
-            </a:r>
-            <a:r>
-              <a:rPr lang="en-US" sz="2000" b="1" dirty="0" smtClean="0">
-                <a:solidFill>
-                  <a:schemeClr val="bg1"/>
-                </a:solidFill>
-                <a:latin typeface="Consolas" pitchFamily="49" charset="0"/>
-                <a:ea typeface="Roboto" pitchFamily="2" charset="0"/>
-                <a:cs typeface="Consolas" pitchFamily="49" charset="0"/>
-              </a:rPr>
-              <a:t>);</a:t>
+              <a:t>(amount);</a:t>
             </a:r>
             <a:r>
               <a:rPr lang="en-US" sz="2000" b="1" dirty="0" smtClean="0">
@@ -12981,16 +12957,6 @@
               </a:rPr>
               <a:t>}</a:t>
             </a:r>
-            <a:endParaRPr lang="en-US" sz="2000" b="1" dirty="0">
-              <a:solidFill>
-                <a:schemeClr val="bg1">
-                  <a:lumMod val="50000"/>
-                </a:schemeClr>
-              </a:solidFill>
-              <a:latin typeface="Consolas" pitchFamily="49" charset="0"/>
-              <a:ea typeface="Roboto" pitchFamily="2" charset="0"/>
-              <a:cs typeface="Consolas" pitchFamily="49" charset="0"/>
-            </a:endParaRPr>
           </a:p>
         </p:txBody>
       </p:sp>
@@ -17945,15 +17911,7 @@
                   <a:srgbClr val="00B0F0"/>
                 </a:solidFill>
               </a:rPr>
-              <a:t>Systemische </a:t>
-            </a:r>
-            <a:r>
-              <a:rPr lang="de-DE" dirty="0" smtClean="0">
-                <a:solidFill>
-                  <a:srgbClr val="00B0F0"/>
-                </a:solidFill>
-              </a:rPr>
-              <a:t>Metapher</a:t>
+              <a:t>Systemische Metapher</a:t>
             </a:r>
             <a:endParaRPr lang="en-US" dirty="0">
               <a:solidFill>
@@ -21464,18 +21422,7 @@
                 <a:ea typeface="Roboto" pitchFamily="2" charset="0"/>
                 <a:cs typeface="Consolas" pitchFamily="49" charset="0"/>
               </a:rPr>
-              <a:t>duck </a:t>
-            </a:r>
-            <a:r>
-              <a:rPr lang="en-US" sz="2400" b="1" dirty="0" smtClean="0">
-                <a:solidFill>
-                  <a:schemeClr val="bg1"/>
-                </a:solidFill>
-                <a:latin typeface="Consolas" pitchFamily="49" charset="0"/>
-                <a:ea typeface="Roboto" pitchFamily="2" charset="0"/>
-                <a:cs typeface="Consolas" pitchFamily="49" charset="0"/>
-              </a:rPr>
-              <a:t>= </a:t>
+              <a:t>duck = </a:t>
             </a:r>
             <a:r>
               <a:rPr lang="en-US" sz="2400" b="1" dirty="0" smtClean="0">
@@ -27652,14 +27599,6 @@
               </a:rPr>
               <a:t>return null;</a:t>
             </a:r>
-            <a:endParaRPr lang="en-US" sz="2000" b="1" dirty="0">
-              <a:solidFill>
-                <a:schemeClr val="bg1"/>
-              </a:solidFill>
-              <a:latin typeface="Consolas" pitchFamily="49" charset="0"/>
-              <a:ea typeface="Roboto" pitchFamily="2" charset="0"/>
-              <a:cs typeface="Consolas" pitchFamily="49" charset="0"/>
-            </a:endParaRPr>
           </a:p>
         </p:txBody>
       </p:sp>
@@ -27952,16 +27891,6 @@
               </a:rPr>
               <a:t>return result;</a:t>
             </a:r>
-            <a:endParaRPr lang="en-US" sz="2000" b="1" dirty="0">
-              <a:solidFill>
-                <a:schemeClr val="bg1">
-                  <a:lumMod val="75000"/>
-                </a:schemeClr>
-              </a:solidFill>
-              <a:latin typeface="Consolas" pitchFamily="49" charset="0"/>
-              <a:ea typeface="Roboto" pitchFamily="2" charset="0"/>
-              <a:cs typeface="Consolas" pitchFamily="49" charset="0"/>
-            </a:endParaRPr>
           </a:p>
         </p:txBody>
       </p:sp>
@@ -28574,10 +28503,6 @@
               </a:rPr>
               <a:t>1</a:t>
             </a:r>
-            <a:endParaRPr lang="de-DE" sz="6000" dirty="0">
-              <a:latin typeface="Bebas Neue" pitchFamily="34" charset="0"/>
-              <a:ea typeface="Roboto" pitchFamily="2" charset="0"/>
-            </a:endParaRPr>
           </a:p>
         </p:txBody>
       </p:sp>
@@ -28941,10 +28866,6 @@
               </a:rPr>
               <a:t>1</a:t>
             </a:r>
-            <a:endParaRPr lang="de-DE" sz="6000" dirty="0">
-              <a:latin typeface="Bebas Neue" pitchFamily="34" charset="0"/>
-              <a:ea typeface="Roboto" pitchFamily="2" charset="0"/>
-            </a:endParaRPr>
           </a:p>
         </p:txBody>
       </p:sp>
@@ -29391,10 +29312,6 @@
               </a:rPr>
               <a:t>1</a:t>
             </a:r>
-            <a:endParaRPr lang="de-DE" sz="6000" dirty="0">
-              <a:latin typeface="Bebas Neue" pitchFamily="34" charset="0"/>
-              <a:ea typeface="Roboto" pitchFamily="2" charset="0"/>
-            </a:endParaRPr>
           </a:p>
         </p:txBody>
       </p:sp>
@@ -29725,18 +29642,6 @@
               </a:rPr>
               <a:t>12/24/90</a:t>
             </a:r>
-            <a:endParaRPr kumimoji="0" lang="de-DE" sz="4400" b="0" i="0" u="none" strike="noStrike" kern="1200" cap="none" spc="0" normalizeH="0" baseline="0" noProof="0" dirty="0" smtClean="0">
-              <a:ln w="19050">
-                <a:noFill/>
-              </a:ln>
-              <a:solidFill>
-                <a:srgbClr val="00B7FF"/>
-              </a:solidFill>
-              <a:uLnTx/>
-              <a:uFillTx/>
-              <a:latin typeface="Roboto" pitchFamily="2" charset="0"/>
-              <a:ea typeface="Roboto" pitchFamily="2" charset="0"/>
-            </a:endParaRPr>
           </a:p>
         </p:txBody>
       </p:sp>
@@ -29825,10 +29730,6 @@
               </a:rPr>
               <a:t>1</a:t>
             </a:r>
-            <a:endParaRPr lang="de-DE" sz="6000" dirty="0">
-              <a:latin typeface="Bebas Neue" pitchFamily="34" charset="0"/>
-              <a:ea typeface="Roboto" pitchFamily="2" charset="0"/>
-            </a:endParaRPr>
           </a:p>
         </p:txBody>
       </p:sp>
@@ -30220,18 +30121,6 @@
               </a:rPr>
               <a:t>12/24/90</a:t>
             </a:r>
-            <a:endParaRPr kumimoji="0" lang="de-DE" sz="4400" b="0" i="0" u="none" strike="noStrike" kern="1200" cap="none" spc="0" normalizeH="0" baseline="0" noProof="0" dirty="0" smtClean="0">
-              <a:ln w="19050">
-                <a:noFill/>
-              </a:ln>
-              <a:solidFill>
-                <a:srgbClr val="00B7FF"/>
-              </a:solidFill>
-              <a:uLnTx/>
-              <a:uFillTx/>
-              <a:latin typeface="Roboto" pitchFamily="2" charset="0"/>
-              <a:ea typeface="Roboto" pitchFamily="2" charset="0"/>
-            </a:endParaRPr>
           </a:p>
         </p:txBody>
       </p:sp>
@@ -32931,14 +32820,6 @@
               </a:rPr>
               <a:t>};</a:t>
             </a:r>
-            <a:endParaRPr lang="en-US" sz="1800" b="1" dirty="0">
-              <a:solidFill>
-                <a:schemeClr val="bg1"/>
-              </a:solidFill>
-              <a:latin typeface="Consolas" pitchFamily="49" charset="0"/>
-              <a:ea typeface="Roboto" pitchFamily="2" charset="0"/>
-              <a:cs typeface="Consolas" pitchFamily="49" charset="0"/>
-            </a:endParaRPr>
           </a:p>
         </p:txBody>
       </p:sp>

</xml_diff>